<commit_message>
PU2 - Kleine Änderungen
Die 2. Folie der Slideshow ist fertiggestellt. Ich habe die Struktur der Deokumente ein wenig verändert.
</commit_message>
<xml_diff>
--- a/arbeit-schwimmunterricht-zensiert.pptx
+++ b/arbeit-schwimmunterricht-zensiert.pptx
@@ -8,6 +8,7 @@
     <p:sldId id="256" r:id="rId3"/>
     <p:sldId id="257" r:id="rId4"/>
     <p:sldId id="258" r:id="rId5"/>
+    <p:sldId id="259" r:id="rId6"/>
   </p:sldIdLst>
   <p:sldSz cx="12192000" cy="6858000"/>
   <p:notesSz cx="12192000" cy="6858000"/>
@@ -139,7 +140,7 @@
         <p:spPr bwMode="auto">
           <a:xfrm>
             <a:off x="1828800" y="5634245"/>
-            <a:ext cx="8534399" cy="675074"/>
+            <a:ext cx="8534399" cy="675073"/>
           </a:xfrm>
         </p:spPr>
         <p:txBody>
@@ -3676,7 +3677,7 @@
         <p:spPr bwMode="auto">
           <a:xfrm>
             <a:off x="10813062" y="110041"/>
-            <a:ext cx="418251" cy="212325"/>
+            <a:ext cx="418251" cy="212324"/>
           </a:xfrm>
           <a:custGeom>
             <a:avLst/>
@@ -3846,7 +3847,7 @@
         </p:nvSpPr>
         <p:spPr bwMode="auto">
           <a:xfrm>
-            <a:off x="11710810" y="346115"/>
+            <a:off x="11710809" y="346115"/>
             <a:ext cx="443370" cy="231958"/>
           </a:xfrm>
           <a:custGeom>
@@ -5728,7 +5729,7 @@
         <p:spPr bwMode="auto">
           <a:xfrm>
             <a:off x="9421987" y="691915"/>
-            <a:ext cx="560210" cy="342315"/>
+            <a:ext cx="560210" cy="342314"/>
           </a:xfrm>
           <a:custGeom>
             <a:avLst/>
@@ -6070,7 +6071,7 @@
         <p:spPr bwMode="auto">
           <a:xfrm>
             <a:off x="7358097" y="468666"/>
-            <a:ext cx="631330" cy="342315"/>
+            <a:ext cx="631330" cy="342314"/>
           </a:xfrm>
           <a:custGeom>
             <a:avLst/>
@@ -7095,7 +7096,7 @@
         </p:nvSpPr>
         <p:spPr bwMode="auto">
           <a:xfrm>
-            <a:off x="8988777" y="1381933"/>
+            <a:off x="8988777" y="1381932"/>
             <a:ext cx="695959" cy="506666"/>
           </a:xfrm>
           <a:custGeom>
@@ -7438,7 +7439,7 @@
         <p:spPr bwMode="auto">
           <a:xfrm>
             <a:off x="10469314" y="1813550"/>
-            <a:ext cx="722487" cy="574590"/>
+            <a:ext cx="722486" cy="574590"/>
           </a:xfrm>
           <a:custGeom>
             <a:avLst/>
@@ -9661,7 +9662,7 @@
         <p:spPr bwMode="auto">
           <a:xfrm>
             <a:off x="4559018" y="2251499"/>
-            <a:ext cx="1260121" cy="892999"/>
+            <a:ext cx="1260121" cy="892998"/>
           </a:xfrm>
           <a:custGeom>
             <a:avLst/>
@@ -10686,7 +10687,7 @@
         </p:nvSpPr>
         <p:spPr bwMode="auto">
           <a:xfrm>
-            <a:off x="6327987" y="1137941"/>
+            <a:off x="6327986" y="1137941"/>
             <a:ext cx="837070" cy="515374"/>
           </a:xfrm>
           <a:custGeom>
@@ -10858,7 +10859,7 @@
         <p:spPr bwMode="auto">
           <a:xfrm>
             <a:off x="6444261" y="1892241"/>
-            <a:ext cx="969714" cy="718990"/>
+            <a:ext cx="969714" cy="718989"/>
           </a:xfrm>
           <a:custGeom>
             <a:avLst/>
@@ -11869,7 +11870,7 @@
         </p:nvSpPr>
         <p:spPr bwMode="auto">
           <a:xfrm>
-            <a:off x="3776698" y="-949"/>
+            <a:off x="3776698" y="-948"/>
             <a:ext cx="841867" cy="192374"/>
           </a:xfrm>
           <a:custGeom>
@@ -12889,7 +12890,7 @@
         <p:spPr bwMode="auto">
           <a:xfrm>
             <a:off x="12093786" y="2343174"/>
-            <a:ext cx="98213" cy="355774"/>
+            <a:ext cx="98212" cy="355774"/>
           </a:xfrm>
           <a:custGeom>
             <a:avLst/>
@@ -13328,7 +13329,7 @@
         <p:spPr bwMode="auto">
           <a:xfrm>
             <a:off x="609599" y="6356350"/>
-            <a:ext cx="2844799" cy="365125"/>
+            <a:ext cx="2844798" cy="365125"/>
           </a:xfrm>
           <a:prstGeom prst="rect">
             <a:avLst/>
@@ -13412,7 +13413,7 @@
         <p:spPr bwMode="auto">
           <a:xfrm>
             <a:off x="8737599" y="6356350"/>
-            <a:ext cx="2844799" cy="365125"/>
+            <a:ext cx="2844798" cy="365125"/>
           </a:xfrm>
           <a:prstGeom prst="rect">
             <a:avLst/>
@@ -13782,8 +13783,24 @@
               <a:defRPr/>
             </a:pPr>
             <a:r>
-              <a:rPr lang="en-US" sz="2000"/>
-              <a:t>2022</a:t>
+              <a:rPr sz="2000" b="1" i="1" u="none">
+                <a:latin typeface="DejaVu Sans Mono"/>
+              </a:rPr>
+              <a:t>20. 06. 2022</a:t>
+            </a:r>
+            <a:endParaRPr sz="2000" b="1" i="1" u="none">
+              <a:latin typeface="DejaVu Sans Mono"/>
+            </a:endParaRPr>
+          </a:p>
+          <a:p>
+            <a:pPr>
+              <a:defRPr/>
+            </a:pPr>
+            <a:r>
+              <a:rPr sz="2000" b="1" i="1" u="none">
+                <a:latin typeface="DejaVu Sans Mono"/>
+              </a:rPr>
+              <a:t>niko-w-h.github.io</a:t>
             </a:r>
             <a:endParaRPr sz="2000"/>
           </a:p>
@@ -13959,7 +13976,7 @@
                 <a:ea typeface="Arial Black"/>
                 <a:cs typeface="Arial Black"/>
               </a:rPr>
-              <a:t>`arbeit-schwimmunterricht-zensiert</a:t>
+              <a:t>`arbeit-schwimunterricht-zensiert</a:t>
             </a:r>
             <a:r>
               <a:rPr sz="3200" b="0" i="0" u="none">
@@ -14130,7 +14147,7 @@
         <p:spPr bwMode="auto">
           <a:xfrm rot="0" flipH="0" flipV="0">
             <a:off x="3883726" y="-118621"/>
-            <a:ext cx="4259292" cy="5487627"/>
+            <a:ext cx="4259292" cy="5487626"/>
           </a:xfrm>
           <a:prstGeom prst="rect">
             <a:avLst/>
@@ -14212,6 +14229,103 @@
               <a:solidFill>
                 <a:schemeClr val="bg1"/>
               </a:solidFill>
+              <a:latin typeface="TeXGyreCursor"/>
+              <a:ea typeface="TeXGyreCursor"/>
+              <a:cs typeface="TeXGyreCursor"/>
+            </a:endParaRPr>
+          </a:p>
+        </p:txBody>
+      </p:sp>
+    </p:spTree>
+  </p:cSld>
+  <p:clrMapOvr>
+    <a:masterClrMapping/>
+  </p:clrMapOvr>
+  <mc:AlternateContent xmlns:mc="http://schemas.openxmlformats.org/markup-compatibility/2006">
+    <mc:Choice xmlns:p14="http://schemas.microsoft.com/office/powerpoint/2010/main" Requires="p14">
+      <p:transition p14:dur="2000" advClick="1"/>
+    </mc:Choice>
+    <mc:Fallback>
+      <p:transition advClick="1"/>
+    </mc:Fallback>
+  </mc:AlternateContent>
+</p:sld>
+</file>
+
+<file path=ppt/slides/slide4.xml><?xml version="1.0" encoding="utf-8"?>
+<p:sld xmlns:a="http://schemas.openxmlformats.org/drawingml/2006/main" xmlns:r="http://schemas.openxmlformats.org/officeDocument/2006/relationships" xmlns:p="http://schemas.openxmlformats.org/presentationml/2006/main" xmlns:m="http://schemas.openxmlformats.org/officeDocument/2006/math" xmlns:w="http://schemas.openxmlformats.org/wordprocessingml/2006/main" showMasterPhAnim="0" show="1">
+  <p:cSld name="">
+    <p:spTree>
+      <p:nvGrpSpPr>
+        <p:cNvPr id="1" name="" hidden="0"/>
+        <p:cNvGrpSpPr/>
+        <p:nvPr isPhoto="0" userDrawn="0"/>
+      </p:nvGrpSpPr>
+      <p:grpSpPr bwMode="auto">
+        <a:xfrm>
+          <a:off x="0" y="0"/>
+          <a:ext cx="0" cy="0"/>
+          <a:chOff x="0" y="0"/>
+          <a:chExt cx="0" cy="0"/>
+        </a:xfrm>
+      </p:grpSpPr>
+      <p:pic>
+        <p:nvPicPr>
+          <p:cNvPr id="383364288" name="" hidden="0"/>
+          <p:cNvPicPr>
+            <a:picLocks noChangeAspect="1"/>
+          </p:cNvPicPr>
+          <p:nvPr isPhoto="0" userDrawn="0">
+            <p:ph idx="1" hasCustomPrompt="0"/>
+          </p:nvPr>
+        </p:nvPicPr>
+        <p:blipFill>
+          <a:blip r:embed="rId2"/>
+          <a:stretch/>
+        </p:blipFill>
+        <p:spPr bwMode="auto">
+          <a:xfrm rot="0" flipH="0" flipV="0">
+            <a:off x="-11024" y="1290367"/>
+            <a:ext cx="12214339" cy="4277264"/>
+          </a:xfrm>
+          <a:prstGeom prst="rect">
+            <a:avLst/>
+          </a:prstGeom>
+        </p:spPr>
+      </p:pic>
+      <p:sp>
+        <p:nvSpPr>
+          <p:cNvPr id="795069453" name="" hidden="0"/>
+          <p:cNvSpPr txBox="1"/>
+          <p:nvPr isPhoto="0" userDrawn="0"/>
+        </p:nvSpPr>
+        <p:spPr bwMode="auto">
+          <a:xfrm flipH="0" flipV="0">
+            <a:off x="11054433" y="5589198"/>
+            <a:ext cx="1042682" cy="396275"/>
+          </a:xfrm>
+          <a:prstGeom prst="rect">
+            <a:avLst/>
+          </a:prstGeom>
+          <a:noFill/>
+        </p:spPr>
+        <p:txBody>
+          <a:bodyPr vertOverflow="overflow" horzOverflow="clip" vert="horz" wrap="square" lIns="91440" tIns="45720" rIns="91440" bIns="45720" numCol="1" spcCol="0" rtlCol="0" fromWordArt="0" anchor="t" anchorCtr="0" forceAA="0" upright="0" compatLnSpc="0">
+            <a:spAutoFit/>
+          </a:bodyPr>
+          <a:p>
+            <a:pPr>
+              <a:defRPr/>
+            </a:pPr>
+            <a:r>
+              <a:rPr sz="2000" b="1">
+                <a:latin typeface="TeXGyreCursor"/>
+                <a:ea typeface="TeXGyreCursor"/>
+                <a:cs typeface="TeXGyreCursor"/>
+              </a:rPr>
+              <a:t>[b2]</a:t>
+            </a:r>
+            <a:endParaRPr sz="2000" b="1">
               <a:latin typeface="TeXGyreCursor"/>
               <a:ea typeface="TeXGyreCursor"/>
               <a:cs typeface="TeXGyreCursor"/>

</xml_diff>

<commit_message>
PU3 - AG2 Teil 1 erledigt
Ich habe Aufgabe 2 gelöst und zum Dokument hinzugefügt, ich wede nun eine oder drei Slides dafür erstellen.
</commit_message>
<xml_diff>
--- a/arbeit-schwimmunterricht-zensiert.pptx
+++ b/arbeit-schwimmunterricht-zensiert.pptx
@@ -13786,7 +13786,7 @@
               <a:rPr sz="2000" b="1" i="1" u="none">
                 <a:latin typeface="DejaVu Sans Mono"/>
               </a:rPr>
-              <a:t>20. 06. 2022</a:t>
+              <a:t>2022</a:t>
             </a:r>
             <a:endParaRPr sz="2000" b="1" i="1" u="none">
               <a:latin typeface="DejaVu Sans Mono"/>
@@ -13802,7 +13802,9 @@
               </a:rPr>
               <a:t>niko-w-h.github.io</a:t>
             </a:r>
-            <a:endParaRPr sz="2000"/>
+            <a:endParaRPr sz="2000" b="1" i="1" u="none">
+              <a:latin typeface="DejaVu Sans Mono"/>
+            </a:endParaRPr>
           </a:p>
         </p:txBody>
       </p:sp>
@@ -13976,7 +13978,7 @@
                 <a:ea typeface="Arial Black"/>
                 <a:cs typeface="Arial Black"/>
               </a:rPr>
-              <a:t>`arbeit-schwimunterricht-zensiert</a:t>
+              <a:t>`arbeit-schwimmunterricht-zensiert</a:t>
             </a:r>
             <a:r>
               <a:rPr sz="3200" b="0" i="0" u="none">

</xml_diff>

<commit_message>
PU4 - Aufgabe 1 fertiggestellt
Aufgabe 1 ist nun fertiggestellt.
</commit_message>
<xml_diff>
--- a/arbeit-schwimmunterricht-zensiert.pptx
+++ b/arbeit-schwimmunterricht-zensiert.pptx
@@ -9,6 +9,10 @@
     <p:sldId id="257" r:id="rId4"/>
     <p:sldId id="258" r:id="rId5"/>
     <p:sldId id="259" r:id="rId6"/>
+    <p:sldId id="260" r:id="rId7"/>
+    <p:sldId id="261" r:id="rId8"/>
+    <p:sldId id="262" r:id="rId9"/>
+    <p:sldId id="263" r:id="rId10"/>
   </p:sldIdLst>
   <p:sldSz cx="12192000" cy="6858000"/>
   <p:notesSz cx="12192000" cy="6858000"/>
@@ -14351,6 +14355,1341 @@
 </p:sld>
 </file>
 
+<file path=ppt/slides/slide5.xml><?xml version="1.0" encoding="utf-8"?>
+<p:sld xmlns:a="http://schemas.openxmlformats.org/drawingml/2006/main" xmlns:r="http://schemas.openxmlformats.org/officeDocument/2006/relationships" xmlns:p="http://schemas.openxmlformats.org/presentationml/2006/main" xmlns:m="http://schemas.openxmlformats.org/officeDocument/2006/math" xmlns:w="http://schemas.openxmlformats.org/wordprocessingml/2006/main" showMasterPhAnim="0" show="1">
+  <p:cSld name="">
+    <p:spTree>
+      <p:nvGrpSpPr>
+        <p:cNvPr id="1" name="" hidden="0"/>
+        <p:cNvGrpSpPr/>
+        <p:nvPr isPhoto="0" userDrawn="0"/>
+      </p:nvGrpSpPr>
+      <p:grpSpPr bwMode="auto">
+        <a:xfrm>
+          <a:off x="0" y="0"/>
+          <a:ext cx="0" cy="0"/>
+          <a:chOff x="0" y="0"/>
+          <a:chExt cx="0" cy="0"/>
+        </a:xfrm>
+      </p:grpSpPr>
+      <p:sp>
+        <p:nvSpPr>
+          <p:cNvPr id="29426802" name="Объект 2" hidden="0"/>
+          <p:cNvSpPr>
+            <a:spLocks noGrp="1"/>
+          </p:cNvSpPr>
+          <p:nvPr isPhoto="0" userDrawn="0">
+            <p:ph idx="1" hasCustomPrompt="0"/>
+          </p:nvPr>
+        </p:nvSpPr>
+        <p:spPr bwMode="auto"/>
+        <p:txBody>
+          <a:bodyPr vertOverflow="overflow" horzOverflow="clip" vert="horz" wrap="square" lIns="91440" tIns="45720" rIns="91440" bIns="45720" numCol="1" spcCol="0" rtlCol="0" fromWordArt="0" anchor="t" anchorCtr="0" forceAA="0" upright="0" compatLnSpc="0">
+            <a:normAutofit fontScale="95000" lnSpcReduction="1000"/>
+          </a:bodyPr>
+          <a:lstStyle>
+            <a:lvl1pPr>
+              <a:defRPr>
+                <a:solidFill>
+                  <a:schemeClr val="bg1"/>
+                </a:solidFill>
+              </a:defRPr>
+            </a:lvl1pPr>
+            <a:lvl2pPr>
+              <a:defRPr>
+                <a:solidFill>
+                  <a:schemeClr val="bg1"/>
+                </a:solidFill>
+              </a:defRPr>
+            </a:lvl2pPr>
+            <a:lvl3pPr>
+              <a:defRPr>
+                <a:solidFill>
+                  <a:schemeClr val="bg1"/>
+                </a:solidFill>
+              </a:defRPr>
+            </a:lvl3pPr>
+            <a:lvl4pPr>
+              <a:defRPr>
+                <a:solidFill>
+                  <a:schemeClr val="bg1"/>
+                </a:solidFill>
+              </a:defRPr>
+            </a:lvl4pPr>
+            <a:lvl5pPr>
+              <a:defRPr>
+                <a:solidFill>
+                  <a:schemeClr val="bg1"/>
+                </a:solidFill>
+              </a:defRPr>
+            </a:lvl5pPr>
+          </a:lstStyle>
+          <a:p>
+            <a:pPr>
+              <a:defRPr/>
+            </a:pPr>
+            <a:r>
+              <a:rPr b="1">
+                <a:solidFill>
+                  <a:schemeClr val="bg1"/>
+                </a:solidFill>
+                <a:latin typeface="Arial Black"/>
+                <a:ea typeface="Arial Black"/>
+                <a:cs typeface="Arial Black"/>
+              </a:rPr>
+              <a:t>Duschen vor dem Baden!</a:t>
+            </a:r>
+            <a:endParaRPr b="1">
+              <a:solidFill>
+                <a:schemeClr val="bg1"/>
+              </a:solidFill>
+              <a:latin typeface="Arial Black"/>
+              <a:ea typeface="Arial Black"/>
+              <a:cs typeface="Arial Black"/>
+            </a:endParaRPr>
+          </a:p>
+          <a:p>
+            <a:pPr>
+              <a:defRPr/>
+            </a:pPr>
+            <a:endParaRPr b="1">
+              <a:solidFill>
+                <a:schemeClr val="bg1"/>
+              </a:solidFill>
+              <a:latin typeface="Arial Black"/>
+              <a:ea typeface="Arial Black"/>
+              <a:cs typeface="Arial Black"/>
+            </a:endParaRPr>
+          </a:p>
+          <a:p>
+            <a:pPr>
+              <a:defRPr/>
+            </a:pPr>
+            <a:r>
+              <a:rPr b="1">
+                <a:solidFill>
+                  <a:schemeClr val="bg1"/>
+                </a:solidFill>
+                <a:latin typeface="Arial Black"/>
+                <a:ea typeface="Arial Black"/>
+                <a:cs typeface="Arial Black"/>
+              </a:rPr>
+              <a:t>Bei Gewitter nicht baden!</a:t>
+            </a:r>
+            <a:endParaRPr b="1">
+              <a:solidFill>
+                <a:schemeClr val="bg1"/>
+              </a:solidFill>
+              <a:latin typeface="Arial Black"/>
+              <a:ea typeface="Arial Black"/>
+              <a:cs typeface="Arial Black"/>
+            </a:endParaRPr>
+          </a:p>
+          <a:p>
+            <a:pPr>
+              <a:defRPr/>
+            </a:pPr>
+            <a:endParaRPr b="1">
+              <a:solidFill>
+                <a:schemeClr val="bg1"/>
+              </a:solidFill>
+              <a:latin typeface="Arial Black"/>
+              <a:ea typeface="Arial Black"/>
+              <a:cs typeface="Arial Black"/>
+            </a:endParaRPr>
+          </a:p>
+          <a:p>
+            <a:pPr>
+              <a:defRPr/>
+            </a:pPr>
+            <a:r>
+              <a:rPr b="1">
+                <a:solidFill>
+                  <a:schemeClr val="bg1"/>
+                </a:solidFill>
+                <a:latin typeface="Arial Black"/>
+                <a:ea typeface="Arial Black"/>
+                <a:cs typeface="Arial Black"/>
+              </a:rPr>
+              <a:t>Nicht mit vollem* oder leerem Magen ins Wasser!</a:t>
+            </a:r>
+            <a:endParaRPr b="1">
+              <a:solidFill>
+                <a:schemeClr val="bg1"/>
+              </a:solidFill>
+              <a:latin typeface="Arial Black"/>
+              <a:ea typeface="Arial Black"/>
+              <a:cs typeface="Arial Black"/>
+            </a:endParaRPr>
+          </a:p>
+          <a:p>
+            <a:pPr>
+              <a:defRPr/>
+            </a:pPr>
+            <a:endParaRPr b="1">
+              <a:solidFill>
+                <a:schemeClr val="bg1"/>
+              </a:solidFill>
+              <a:latin typeface="Arial Black"/>
+              <a:ea typeface="Arial Black"/>
+              <a:cs typeface="Arial Black"/>
+            </a:endParaRPr>
+          </a:p>
+          <a:p>
+            <a:pPr>
+              <a:defRPr/>
+            </a:pPr>
+            <a:r>
+              <a:rPr b="1">
+                <a:solidFill>
+                  <a:schemeClr val="bg1"/>
+                </a:solidFill>
+                <a:latin typeface="Arial Black"/>
+                <a:ea typeface="Arial Black"/>
+                <a:cs typeface="Arial Black"/>
+              </a:rPr>
+              <a:t>Nicht bei Schiffen und Booten baden!</a:t>
+            </a:r>
+            <a:endParaRPr b="1">
+              <a:solidFill>
+                <a:schemeClr val="bg1"/>
+              </a:solidFill>
+              <a:latin typeface="Arial Black"/>
+              <a:ea typeface="Arial Black"/>
+              <a:cs typeface="Arial Black"/>
+            </a:endParaRPr>
+          </a:p>
+          <a:p>
+            <a:pPr>
+              <a:defRPr/>
+            </a:pPr>
+            <a:endParaRPr b="1">
+              <a:solidFill>
+                <a:schemeClr val="bg1"/>
+              </a:solidFill>
+              <a:latin typeface="Arial Black"/>
+              <a:ea typeface="Arial Black"/>
+              <a:cs typeface="Arial Black"/>
+            </a:endParaRPr>
+          </a:p>
+          <a:p>
+            <a:pPr>
+              <a:defRPr/>
+            </a:pPr>
+            <a:r>
+              <a:rPr b="1">
+                <a:solidFill>
+                  <a:schemeClr val="bg1"/>
+                </a:solidFill>
+                <a:latin typeface="Arial Black"/>
+                <a:ea typeface="Arial Black"/>
+                <a:cs typeface="Arial Black"/>
+              </a:rPr>
+              <a:t>Springe nur in tiefes und sicheres Wasser!</a:t>
+            </a:r>
+            <a:endParaRPr b="1">
+              <a:solidFill>
+                <a:schemeClr val="bg1"/>
+              </a:solidFill>
+              <a:latin typeface="Arial Black"/>
+              <a:ea typeface="Arial Black"/>
+              <a:cs typeface="Arial Black"/>
+            </a:endParaRPr>
+          </a:p>
+        </p:txBody>
+      </p:sp>
+      <p:sp>
+        <p:nvSpPr>
+          <p:cNvPr id="1281319333" name="Заголовок 6" hidden="0"/>
+          <p:cNvSpPr>
+            <a:spLocks noGrp="1"/>
+          </p:cNvSpPr>
+          <p:nvPr isPhoto="0" userDrawn="0">
+            <p:ph type="title" hasCustomPrompt="0"/>
+          </p:nvPr>
+        </p:nvSpPr>
+        <p:spPr bwMode="auto"/>
+        <p:txBody>
+          <a:bodyPr/>
+          <a:lstStyle/>
+          <a:p>
+            <a:pPr>
+              <a:defRPr/>
+            </a:pPr>
+            <a:r>
+              <a:rPr>
+                <a:latin typeface="Arial Black"/>
+                <a:ea typeface="Arial Black"/>
+                <a:cs typeface="Arial Black"/>
+              </a:rPr>
+              <a:t>Baderegeln</a:t>
+            </a:r>
+            <a:endParaRPr>
+              <a:latin typeface="Arial Black"/>
+              <a:ea typeface="Arial Black"/>
+              <a:cs typeface="Arial Black"/>
+            </a:endParaRPr>
+          </a:p>
+        </p:txBody>
+      </p:sp>
+      <p:sp>
+        <p:nvSpPr>
+          <p:cNvPr id="705825589" name="" hidden="0"/>
+          <p:cNvSpPr txBox="1"/>
+          <p:nvPr isPhoto="0" userDrawn="0"/>
+        </p:nvSpPr>
+        <p:spPr bwMode="auto">
+          <a:xfrm flipH="0" flipV="0">
+            <a:off x="612877" y="4994627"/>
+            <a:ext cx="3273188" cy="365796"/>
+          </a:xfrm>
+          <a:prstGeom prst="rect">
+            <a:avLst/>
+          </a:prstGeom>
+          <a:noFill/>
+        </p:spPr>
+        <p:txBody>
+          <a:bodyPr vertOverflow="overflow" horzOverflow="clip" vert="horz" wrap="square" lIns="91440" tIns="45720" rIns="91440" bIns="45720" numCol="1" spcCol="0" rtlCol="0" fromWordArt="0" anchor="t" anchorCtr="0" forceAA="0" upright="0" compatLnSpc="0">
+            <a:spAutoFit/>
+          </a:bodyPr>
+          <a:p>
+            <a:pPr>
+              <a:defRPr/>
+            </a:pPr>
+            <a:r>
+              <a:rPr b="1">
+                <a:solidFill>
+                  <a:schemeClr val="bg1"/>
+                </a:solidFill>
+                <a:latin typeface="TeXGyreCursor"/>
+                <a:ea typeface="TeXGyreCursor"/>
+                <a:cs typeface="TeXGyreCursor"/>
+              </a:rPr>
+              <a:t>[*] = Siehe Dokument</a:t>
+            </a:r>
+            <a:endParaRPr b="1">
+              <a:solidFill>
+                <a:schemeClr val="bg1"/>
+              </a:solidFill>
+              <a:latin typeface="TeXGyreCursor"/>
+              <a:ea typeface="TeXGyreCursor"/>
+              <a:cs typeface="TeXGyreCursor"/>
+            </a:endParaRPr>
+          </a:p>
+        </p:txBody>
+      </p:sp>
+    </p:spTree>
+  </p:cSld>
+  <p:clrMapOvr>
+    <a:masterClrMapping/>
+  </p:clrMapOvr>
+  <mc:AlternateContent xmlns:mc="http://schemas.openxmlformats.org/markup-compatibility/2006">
+    <mc:Choice xmlns:p14="http://schemas.microsoft.com/office/powerpoint/2010/main" Requires="p14">
+      <p:transition p14:dur="2000" advClick="1"/>
+    </mc:Choice>
+    <mc:Fallback>
+      <p:transition advClick="1"/>
+    </mc:Fallback>
+  </mc:AlternateContent>
+</p:sld>
+</file>
+
+<file path=ppt/slides/slide6.xml><?xml version="1.0" encoding="utf-8"?>
+<p:sld xmlns:a="http://schemas.openxmlformats.org/drawingml/2006/main" xmlns:r="http://schemas.openxmlformats.org/officeDocument/2006/relationships" xmlns:p="http://schemas.openxmlformats.org/presentationml/2006/main" xmlns:m="http://schemas.openxmlformats.org/officeDocument/2006/math" xmlns:w="http://schemas.openxmlformats.org/wordprocessingml/2006/main" showMasterPhAnim="0" show="1">
+  <p:cSld name="">
+    <p:spTree>
+      <p:nvGrpSpPr>
+        <p:cNvPr id="1" name="" hidden="0"/>
+        <p:cNvGrpSpPr/>
+        <p:nvPr isPhoto="0" userDrawn="0"/>
+      </p:nvGrpSpPr>
+      <p:grpSpPr bwMode="auto">
+        <a:xfrm>
+          <a:off x="0" y="0"/>
+          <a:ext cx="0" cy="0"/>
+          <a:chOff x="0" y="0"/>
+          <a:chExt cx="0" cy="0"/>
+        </a:xfrm>
+      </p:grpSpPr>
+      <p:pic>
+        <p:nvPicPr>
+          <p:cNvPr id="1607444272" name="" hidden="0"/>
+          <p:cNvPicPr>
+            <a:picLocks noChangeAspect="1"/>
+          </p:cNvPicPr>
+          <p:nvPr isPhoto="0" userDrawn="0">
+            <p:ph idx="1" hasCustomPrompt="0"/>
+          </p:nvPr>
+        </p:nvPicPr>
+        <p:blipFill>
+          <a:blip r:embed="rId2"/>
+          <a:stretch/>
+        </p:blipFill>
+        <p:spPr bwMode="auto">
+          <a:xfrm rot="0">
+            <a:off x="-248914" y="-1794314"/>
+            <a:ext cx="2014638" cy="4525961"/>
+          </a:xfrm>
+          <a:prstGeom prst="rect">
+            <a:avLst/>
+          </a:prstGeom>
+        </p:spPr>
+      </p:pic>
+      <p:sp>
+        <p:nvSpPr>
+          <p:cNvPr id="1523524419" name="Заголовок 6" hidden="0"/>
+          <p:cNvSpPr>
+            <a:spLocks noGrp="1"/>
+          </p:cNvSpPr>
+          <p:nvPr isPhoto="0" userDrawn="0">
+            <p:ph type="title" hasCustomPrompt="0"/>
+          </p:nvPr>
+        </p:nvSpPr>
+        <p:spPr bwMode="auto">
+          <a:xfrm>
+            <a:off x="609598" y="468666"/>
+            <a:ext cx="10972800" cy="827426"/>
+          </a:xfrm>
+        </p:spPr>
+        <p:txBody>
+          <a:bodyPr/>
+          <a:lstStyle/>
+          <a:p>
+            <a:pPr>
+              <a:defRPr/>
+            </a:pPr>
+            <a:r>
+              <a:rPr>
+                <a:latin typeface="Arial Black"/>
+                <a:ea typeface="Arial Black"/>
+                <a:cs typeface="Arial Black"/>
+              </a:rPr>
+              <a:t>Schwimmabzeichen: </a:t>
+            </a:r>
+            <a:r>
+              <a:rPr>
+                <a:solidFill>
+                  <a:srgbClr val="D95A00"/>
+                </a:solidFill>
+                <a:latin typeface="Arial Black"/>
+                <a:ea typeface="Arial Black"/>
+                <a:cs typeface="Arial Black"/>
+              </a:rPr>
+              <a:t>Bronze</a:t>
+            </a:r>
+            <a:endParaRPr>
+              <a:latin typeface="Arial Black"/>
+              <a:ea typeface="Arial Black"/>
+              <a:cs typeface="Arial Black"/>
+            </a:endParaRPr>
+          </a:p>
+        </p:txBody>
+      </p:sp>
+      <p:sp>
+        <p:nvSpPr>
+          <p:cNvPr id="1472895117" name="" hidden="0"/>
+          <p:cNvSpPr txBox="1"/>
+          <p:nvPr isPhoto="0" userDrawn="0"/>
+        </p:nvSpPr>
+        <p:spPr bwMode="auto">
+          <a:xfrm flipH="0" flipV="0">
+            <a:off x="758404" y="1611090"/>
+            <a:ext cx="11622939" cy="4358675"/>
+          </a:xfrm>
+          <a:prstGeom prst="rect">
+            <a:avLst/>
+          </a:prstGeom>
+          <a:noFill/>
+        </p:spPr>
+        <p:txBody>
+          <a:bodyPr vertOverflow="overflow" horzOverflow="clip" vert="horz" wrap="square" lIns="91440" tIns="45720" rIns="91440" bIns="45720" numCol="1" spcCol="0" rtlCol="0" fromWordArt="0" anchor="t" anchorCtr="0" forceAA="0" upright="0" compatLnSpc="0">
+            <a:spAutoFit/>
+          </a:bodyPr>
+          <a:p>
+            <a:pPr marL="283879" indent="-283879" algn="ctr">
+              <a:buFont typeface="Arial"/>
+              <a:buChar char="–"/>
+              <a:defRPr/>
+            </a:pPr>
+            <a:r>
+              <a:rPr sz="2800">
+                <a:solidFill>
+                  <a:schemeClr val="bg1"/>
+                </a:solidFill>
+                <a:latin typeface="Arial Black"/>
+                <a:ea typeface="Arial Black"/>
+                <a:cs typeface="Arial Black"/>
+              </a:rPr>
+              <a:t>Kenntnis von Baderegeln</a:t>
+            </a:r>
+            <a:endParaRPr sz="2800">
+              <a:solidFill>
+                <a:schemeClr val="bg1"/>
+              </a:solidFill>
+              <a:latin typeface="Arial Black"/>
+              <a:ea typeface="Arial Black"/>
+              <a:cs typeface="Arial Black"/>
+            </a:endParaRPr>
+          </a:p>
+          <a:p>
+            <a:pPr marL="283879" indent="-283879" algn="ctr">
+              <a:buFont typeface="Arial"/>
+              <a:buChar char="–"/>
+              <a:defRPr/>
+            </a:pPr>
+            <a:endParaRPr sz="2800">
+              <a:solidFill>
+                <a:schemeClr val="bg1"/>
+              </a:solidFill>
+              <a:latin typeface="Arial Black"/>
+              <a:ea typeface="Arial Black"/>
+              <a:cs typeface="Arial Black"/>
+            </a:endParaRPr>
+          </a:p>
+          <a:p>
+            <a:pPr marL="283879" indent="-283879" algn="ctr">
+              <a:buFont typeface="Arial"/>
+              <a:buChar char="–"/>
+              <a:defRPr/>
+            </a:pPr>
+            <a:r>
+              <a:rPr sz="2800">
+                <a:solidFill>
+                  <a:schemeClr val="bg1"/>
+                </a:solidFill>
+                <a:latin typeface="Arial Black"/>
+                <a:ea typeface="Arial Black"/>
+                <a:cs typeface="Arial Black"/>
+              </a:rPr>
+              <a:t>ein Paketsprung vom 1m Brett</a:t>
+            </a:r>
+            <a:endParaRPr sz="2800">
+              <a:solidFill>
+                <a:schemeClr val="bg1"/>
+              </a:solidFill>
+              <a:latin typeface="Arial Black"/>
+              <a:ea typeface="Arial Black"/>
+              <a:cs typeface="Arial Black"/>
+            </a:endParaRPr>
+          </a:p>
+          <a:p>
+            <a:pPr marL="283879" indent="-283879" algn="ctr">
+              <a:buFont typeface="Arial"/>
+              <a:buChar char="–"/>
+              <a:defRPr/>
+            </a:pPr>
+            <a:endParaRPr sz="2800">
+              <a:solidFill>
+                <a:schemeClr val="bg1"/>
+              </a:solidFill>
+              <a:latin typeface="Arial Black"/>
+              <a:ea typeface="Arial Black"/>
+              <a:cs typeface="Arial Black"/>
+            </a:endParaRPr>
+          </a:p>
+          <a:p>
+            <a:pPr marL="283879" indent="-283879" algn="ctr">
+              <a:buFont typeface="Arial"/>
+              <a:buChar char="–"/>
+              <a:defRPr/>
+            </a:pPr>
+            <a:r>
+              <a:rPr sz="2800">
+                <a:solidFill>
+                  <a:schemeClr val="bg1"/>
+                </a:solidFill>
+                <a:latin typeface="Arial Black"/>
+                <a:ea typeface="Arial Black"/>
+                <a:cs typeface="Arial Black"/>
+              </a:rPr>
+              <a:t>2m tief Tauchen + Tauchring</a:t>
+            </a:r>
+            <a:endParaRPr sz="2800">
+              <a:solidFill>
+                <a:schemeClr val="bg1"/>
+              </a:solidFill>
+              <a:latin typeface="Arial Black"/>
+              <a:ea typeface="Arial Black"/>
+              <a:cs typeface="Arial Black"/>
+            </a:endParaRPr>
+          </a:p>
+          <a:p>
+            <a:pPr marL="283879" indent="-283879" algn="ctr">
+              <a:buFont typeface="Arial"/>
+              <a:buChar char="–"/>
+              <a:defRPr/>
+            </a:pPr>
+            <a:endParaRPr sz="2800">
+              <a:solidFill>
+                <a:schemeClr val="bg1"/>
+              </a:solidFill>
+              <a:latin typeface="Arial Black"/>
+              <a:ea typeface="Arial Black"/>
+              <a:cs typeface="Arial Black"/>
+            </a:endParaRPr>
+          </a:p>
+          <a:p>
+            <a:pPr marL="283879" indent="-283879" algn="ctr">
+              <a:buFont typeface="Arial"/>
+              <a:buChar char="–"/>
+              <a:defRPr/>
+            </a:pPr>
+            <a:r>
+              <a:rPr sz="2800">
+                <a:solidFill>
+                  <a:schemeClr val="bg1"/>
+                </a:solidFill>
+                <a:latin typeface="Arial Black"/>
+                <a:ea typeface="Arial Black"/>
+                <a:cs typeface="Arial Black"/>
+              </a:rPr>
+              <a:t>Sprung mit Kopf vorraus vom Beckenrand, dann mindestens 200m in </a:t>
+            </a:r>
+            <a:r>
+              <a:rPr sz="2800">
+                <a:solidFill>
+                  <a:schemeClr val="bg1"/>
+                </a:solidFill>
+                <a:latin typeface="Arial Black"/>
+                <a:ea typeface="Arial Black"/>
+                <a:cs typeface="Arial Black"/>
+              </a:rPr>
+              <a:t>15 Minuten Schwimmen {150m Bauch- / Rückenlage, 50m in einer anderen}</a:t>
+            </a:r>
+            <a:endParaRPr sz="2800">
+              <a:solidFill>
+                <a:schemeClr val="bg1"/>
+              </a:solidFill>
+              <a:latin typeface="Arial Black"/>
+              <a:ea typeface="Arial Black"/>
+              <a:cs typeface="Arial Black"/>
+            </a:endParaRPr>
+          </a:p>
+          <a:p>
+            <a:pPr marL="283879" indent="-283879" algn="ctr">
+              <a:buFont typeface="Arial"/>
+              <a:buChar char="–"/>
+              <a:defRPr/>
+            </a:pPr>
+            <a:endParaRPr sz="2800">
+              <a:solidFill>
+                <a:schemeClr val="bg1"/>
+              </a:solidFill>
+              <a:latin typeface="Arial Black"/>
+              <a:ea typeface="Arial Black"/>
+              <a:cs typeface="Arial Black"/>
+            </a:endParaRPr>
+          </a:p>
+        </p:txBody>
+      </p:sp>
+    </p:spTree>
+  </p:cSld>
+  <p:clrMapOvr>
+    <a:masterClrMapping/>
+  </p:clrMapOvr>
+  <mc:AlternateContent xmlns:mc="http://schemas.openxmlformats.org/markup-compatibility/2006">
+    <mc:Choice xmlns:p14="http://schemas.microsoft.com/office/powerpoint/2010/main" Requires="p14">
+      <p:transition p14:dur="2000" advClick="1"/>
+    </mc:Choice>
+    <mc:Fallback>
+      <p:transition advClick="1"/>
+    </mc:Fallback>
+  </mc:AlternateContent>
+</p:sld>
+</file>
+
+<file path=ppt/slides/slide7.xml><?xml version="1.0" encoding="utf-8"?>
+<p:sld xmlns:a="http://schemas.openxmlformats.org/drawingml/2006/main" xmlns:r="http://schemas.openxmlformats.org/officeDocument/2006/relationships" xmlns:p="http://schemas.openxmlformats.org/presentationml/2006/main" xmlns:m="http://schemas.openxmlformats.org/officeDocument/2006/math" xmlns:w="http://schemas.openxmlformats.org/wordprocessingml/2006/main" showMasterPhAnim="0" show="1">
+  <p:cSld name="">
+    <p:spTree>
+      <p:nvGrpSpPr>
+        <p:cNvPr id="1" name="" hidden="0"/>
+        <p:cNvGrpSpPr/>
+        <p:nvPr isPhoto="0" userDrawn="0"/>
+      </p:nvGrpSpPr>
+      <p:grpSpPr bwMode="auto">
+        <a:xfrm>
+          <a:off x="0" y="0"/>
+          <a:ext cx="0" cy="0"/>
+          <a:chOff x="0" y="0"/>
+          <a:chExt cx="0" cy="0"/>
+        </a:xfrm>
+      </p:grpSpPr>
+      <p:pic>
+        <p:nvPicPr>
+          <p:cNvPr id="1563591870" name="" hidden="0"/>
+          <p:cNvPicPr>
+            <a:picLocks noChangeAspect="1"/>
+          </p:cNvPicPr>
+          <p:nvPr isPhoto="0" userDrawn="0">
+            <p:ph idx="1" hasCustomPrompt="0"/>
+          </p:nvPr>
+        </p:nvPicPr>
+        <p:blipFill>
+          <a:blip r:embed="rId2"/>
+          <a:stretch/>
+        </p:blipFill>
+        <p:spPr bwMode="auto">
+          <a:xfrm rot="0">
+            <a:off x="-248914" y="-1794314"/>
+            <a:ext cx="2014638" cy="4525961"/>
+          </a:xfrm>
+          <a:prstGeom prst="rect">
+            <a:avLst/>
+          </a:prstGeom>
+        </p:spPr>
+      </p:pic>
+      <p:sp>
+        <p:nvSpPr>
+          <p:cNvPr id="916309568" name="Заголовок 6" hidden="0"/>
+          <p:cNvSpPr>
+            <a:spLocks noGrp="1"/>
+          </p:cNvSpPr>
+          <p:nvPr isPhoto="0" userDrawn="0">
+            <p:ph type="title" hasCustomPrompt="0"/>
+          </p:nvPr>
+        </p:nvSpPr>
+        <p:spPr bwMode="auto">
+          <a:xfrm>
+            <a:off x="609598" y="468666"/>
+            <a:ext cx="10972800" cy="827426"/>
+          </a:xfrm>
+        </p:spPr>
+        <p:txBody>
+          <a:bodyPr/>
+          <a:lstStyle/>
+          <a:p>
+            <a:pPr>
+              <a:defRPr/>
+            </a:pPr>
+            <a:r>
+              <a:rPr>
+                <a:latin typeface="Arial Black"/>
+                <a:ea typeface="Arial Black"/>
+                <a:cs typeface="Arial Black"/>
+              </a:rPr>
+              <a:t>Schwimmabzeichen: </a:t>
+            </a:r>
+            <a:r>
+              <a:rPr>
+                <a:solidFill>
+                  <a:schemeClr val="bg1">
+                    <a:lumMod val="75000"/>
+                  </a:schemeClr>
+                </a:solidFill>
+                <a:latin typeface="Arial Black"/>
+                <a:ea typeface="Arial Black"/>
+                <a:cs typeface="Arial Black"/>
+              </a:rPr>
+              <a:t>Silber</a:t>
+            </a:r>
+            <a:endParaRPr>
+              <a:latin typeface="Arial Black"/>
+              <a:ea typeface="Arial Black"/>
+              <a:cs typeface="Arial Black"/>
+            </a:endParaRPr>
+          </a:p>
+        </p:txBody>
+      </p:sp>
+      <p:sp>
+        <p:nvSpPr>
+          <p:cNvPr id="1163067828" name="" hidden="0"/>
+          <p:cNvSpPr txBox="1"/>
+          <p:nvPr isPhoto="0" userDrawn="0"/>
+        </p:nvSpPr>
+        <p:spPr bwMode="auto">
+          <a:xfrm flipH="0" flipV="0">
+            <a:off x="758404" y="1611090"/>
+            <a:ext cx="11634963" cy="5212116"/>
+          </a:xfrm>
+          <a:prstGeom prst="rect">
+            <a:avLst/>
+          </a:prstGeom>
+          <a:noFill/>
+        </p:spPr>
+        <p:txBody>
+          <a:bodyPr vertOverflow="overflow" horzOverflow="clip" vert="horz" wrap="square" lIns="91440" tIns="45720" rIns="91440" bIns="45720" numCol="1" spcCol="0" rtlCol="0" fromWordArt="0" anchor="t" anchorCtr="0" forceAA="0" upright="0" compatLnSpc="0">
+            <a:spAutoFit/>
+          </a:bodyPr>
+          <a:p>
+            <a:pPr marL="283879" indent="-283879" algn="ctr">
+              <a:buFont typeface="Arial"/>
+              <a:buChar char="–"/>
+              <a:defRPr/>
+            </a:pPr>
+            <a:r>
+              <a:rPr sz="2800">
+                <a:solidFill>
+                  <a:schemeClr val="bg1"/>
+                </a:solidFill>
+                <a:latin typeface="Arial Black"/>
+                <a:ea typeface="Arial Black"/>
+                <a:cs typeface="Arial Black"/>
+              </a:rPr>
+              <a:t>[Bronze]</a:t>
+            </a:r>
+            <a:endParaRPr sz="2800">
+              <a:solidFill>
+                <a:schemeClr val="bg1"/>
+              </a:solidFill>
+              <a:latin typeface="Arial Black"/>
+              <a:ea typeface="Arial Black"/>
+              <a:cs typeface="Arial Black"/>
+            </a:endParaRPr>
+          </a:p>
+          <a:p>
+            <a:pPr marL="283879" indent="-283879" algn="ctr">
+              <a:buFont typeface="Arial"/>
+              <a:buChar char="–"/>
+              <a:defRPr/>
+            </a:pPr>
+            <a:endParaRPr sz="2800">
+              <a:solidFill>
+                <a:schemeClr val="bg1"/>
+              </a:solidFill>
+              <a:latin typeface="Arial Black"/>
+              <a:ea typeface="Arial Black"/>
+              <a:cs typeface="Arial Black"/>
+            </a:endParaRPr>
+          </a:p>
+          <a:p>
+            <a:pPr marL="283879" indent="-283879" algn="ctr">
+              <a:buFont typeface="Arial"/>
+              <a:buChar char="–"/>
+              <a:defRPr/>
+            </a:pPr>
+            <a:r>
+              <a:rPr sz="2800">
+                <a:solidFill>
+                  <a:schemeClr val="bg1"/>
+                </a:solidFill>
+                <a:latin typeface="Arial Black"/>
+                <a:ea typeface="Arial Black"/>
+                <a:cs typeface="Arial Black"/>
+              </a:rPr>
+              <a:t>Selbstrettung</a:t>
+            </a:r>
+            <a:endParaRPr sz="2800">
+              <a:solidFill>
+                <a:schemeClr val="bg1"/>
+              </a:solidFill>
+              <a:latin typeface="Arial Black"/>
+              <a:ea typeface="Arial Black"/>
+              <a:cs typeface="Arial Black"/>
+            </a:endParaRPr>
+          </a:p>
+          <a:p>
+            <a:pPr marL="283879" indent="-283879" algn="ctr">
+              <a:buFont typeface="Arial"/>
+              <a:buChar char="–"/>
+              <a:defRPr/>
+            </a:pPr>
+            <a:endParaRPr sz="2800">
+              <a:solidFill>
+                <a:schemeClr val="bg1"/>
+              </a:solidFill>
+              <a:latin typeface="Arial Black"/>
+              <a:ea typeface="Arial Black"/>
+              <a:cs typeface="Arial Black"/>
+            </a:endParaRPr>
+          </a:p>
+          <a:p>
+            <a:pPr marL="394023" indent="-394023" algn="ctr">
+              <a:buFont typeface="Arial"/>
+              <a:buChar char="–"/>
+              <a:defRPr/>
+            </a:pPr>
+            <a:r>
+              <a:rPr sz="2800">
+                <a:solidFill>
+                  <a:schemeClr val="bg1"/>
+                </a:solidFill>
+                <a:latin typeface="Arial Black"/>
+                <a:ea typeface="Arial Black"/>
+                <a:cs typeface="Arial Black"/>
+              </a:rPr>
+              <a:t>Sprung von 3 Metern Höhe</a:t>
+            </a:r>
+            <a:endParaRPr sz="2800">
+              <a:solidFill>
+                <a:schemeClr val="bg1"/>
+              </a:solidFill>
+              <a:latin typeface="Arial Black"/>
+              <a:ea typeface="Arial Black"/>
+              <a:cs typeface="Arial Black"/>
+            </a:endParaRPr>
+          </a:p>
+          <a:p>
+            <a:pPr marL="394023" indent="-394023" algn="ctr">
+              <a:buFont typeface="Arial"/>
+              <a:buChar char="–"/>
+              <a:defRPr/>
+            </a:pPr>
+            <a:endParaRPr sz="2800">
+              <a:solidFill>
+                <a:schemeClr val="bg1"/>
+              </a:solidFill>
+              <a:latin typeface="Arial Black"/>
+              <a:ea typeface="Arial Black"/>
+              <a:cs typeface="Arial Black"/>
+            </a:endParaRPr>
+          </a:p>
+          <a:p>
+            <a:pPr marL="394023" indent="-394023" algn="ctr">
+              <a:buFont typeface="Arial"/>
+              <a:buChar char="–"/>
+              <a:defRPr/>
+            </a:pPr>
+            <a:r>
+              <a:rPr sz="2800">
+                <a:solidFill>
+                  <a:schemeClr val="bg1"/>
+                </a:solidFill>
+                <a:latin typeface="Arial Black"/>
+                <a:ea typeface="Arial Black"/>
+                <a:cs typeface="Arial Black"/>
+              </a:rPr>
+              <a:t>10m Streckentauchen</a:t>
+            </a:r>
+            <a:endParaRPr sz="2800">
+              <a:solidFill>
+                <a:schemeClr val="bg1"/>
+              </a:solidFill>
+              <a:latin typeface="Arial Black"/>
+              <a:ea typeface="Arial Black"/>
+              <a:cs typeface="Arial Black"/>
+            </a:endParaRPr>
+          </a:p>
+          <a:p>
+            <a:pPr marL="394023" indent="-394023" algn="ctr">
+              <a:buFont typeface="Arial"/>
+              <a:buChar char="–"/>
+              <a:defRPr/>
+            </a:pPr>
+            <a:endParaRPr sz="2800">
+              <a:solidFill>
+                <a:schemeClr val="bg1"/>
+              </a:solidFill>
+              <a:latin typeface="Arial Black"/>
+              <a:ea typeface="Arial Black"/>
+              <a:cs typeface="Arial Black"/>
+            </a:endParaRPr>
+          </a:p>
+          <a:p>
+            <a:pPr marL="394023" indent="-394023" algn="ctr">
+              <a:buFont typeface="Arial"/>
+              <a:buChar char="–"/>
+              <a:defRPr/>
+            </a:pPr>
+            <a:r>
+              <a:rPr sz="2800">
+                <a:solidFill>
+                  <a:schemeClr val="bg1"/>
+                </a:solidFill>
+                <a:latin typeface="Arial Black"/>
+                <a:ea typeface="Arial Black"/>
+                <a:cs typeface="Arial Black"/>
+              </a:rPr>
+              <a:t>Sprung mit Kopf vorraus vom Beckenrand, dann mindestens 400m in 20 Minuten Schwimmen {300m Bauch- / Rückenlage, 100m in einer anderen}</a:t>
+            </a:r>
+            <a:endParaRPr sz="2800">
+              <a:solidFill>
+                <a:schemeClr val="bg1"/>
+              </a:solidFill>
+              <a:latin typeface="Arial Black"/>
+              <a:ea typeface="Arial Black"/>
+              <a:cs typeface="Arial Black"/>
+            </a:endParaRPr>
+          </a:p>
+          <a:p>
+            <a:pPr marL="394023" indent="-394023" algn="ctr">
+              <a:buFont typeface="Arial"/>
+              <a:buChar char="–"/>
+              <a:defRPr/>
+            </a:pPr>
+            <a:endParaRPr sz="2800">
+              <a:solidFill>
+                <a:schemeClr val="bg1"/>
+              </a:solidFill>
+              <a:latin typeface="Arial Black"/>
+              <a:ea typeface="Arial Black"/>
+              <a:cs typeface="Arial Black"/>
+            </a:endParaRPr>
+          </a:p>
+        </p:txBody>
+      </p:sp>
+    </p:spTree>
+  </p:cSld>
+  <p:clrMapOvr>
+    <a:masterClrMapping/>
+  </p:clrMapOvr>
+  <mc:AlternateContent xmlns:mc="http://schemas.openxmlformats.org/markup-compatibility/2006">
+    <mc:Choice xmlns:p14="http://schemas.microsoft.com/office/powerpoint/2010/main" Requires="p14">
+      <p:transition p14:dur="2000" advClick="1"/>
+    </mc:Choice>
+    <mc:Fallback>
+      <p:transition advClick="1"/>
+    </mc:Fallback>
+  </mc:AlternateContent>
+</p:sld>
+</file>
+
+<file path=ppt/slides/slide8.xml><?xml version="1.0" encoding="utf-8"?>
+<p:sld xmlns:a="http://schemas.openxmlformats.org/drawingml/2006/main" xmlns:r="http://schemas.openxmlformats.org/officeDocument/2006/relationships" xmlns:p="http://schemas.openxmlformats.org/presentationml/2006/main" xmlns:m="http://schemas.openxmlformats.org/officeDocument/2006/math" xmlns:w="http://schemas.openxmlformats.org/wordprocessingml/2006/main" showMasterPhAnim="0" show="1">
+  <p:cSld name="">
+    <p:spTree>
+      <p:nvGrpSpPr>
+        <p:cNvPr id="1" name="" hidden="0"/>
+        <p:cNvGrpSpPr/>
+        <p:nvPr isPhoto="0" userDrawn="0"/>
+      </p:nvGrpSpPr>
+      <p:grpSpPr bwMode="auto">
+        <a:xfrm>
+          <a:off x="0" y="0"/>
+          <a:ext cx="0" cy="0"/>
+          <a:chOff x="0" y="0"/>
+          <a:chExt cx="0" cy="0"/>
+        </a:xfrm>
+      </p:grpSpPr>
+      <p:pic>
+        <p:nvPicPr>
+          <p:cNvPr id="1529339502" name="" hidden="0"/>
+          <p:cNvPicPr>
+            <a:picLocks noChangeAspect="1"/>
+          </p:cNvPicPr>
+          <p:nvPr isPhoto="0" userDrawn="0">
+            <p:ph idx="1" hasCustomPrompt="0"/>
+          </p:nvPr>
+        </p:nvPicPr>
+        <p:blipFill>
+          <a:blip r:embed="rId2"/>
+          <a:stretch/>
+        </p:blipFill>
+        <p:spPr bwMode="auto">
+          <a:xfrm rot="0">
+            <a:off x="-248914" y="-1794314"/>
+            <a:ext cx="2014638" cy="4525961"/>
+          </a:xfrm>
+          <a:prstGeom prst="rect">
+            <a:avLst/>
+          </a:prstGeom>
+        </p:spPr>
+      </p:pic>
+      <p:sp>
+        <p:nvSpPr>
+          <p:cNvPr id="991437960" name="Заголовок 6" hidden="0"/>
+          <p:cNvSpPr>
+            <a:spLocks noGrp="1"/>
+          </p:cNvSpPr>
+          <p:nvPr isPhoto="0" userDrawn="0">
+            <p:ph type="title" hasCustomPrompt="0"/>
+          </p:nvPr>
+        </p:nvSpPr>
+        <p:spPr bwMode="auto">
+          <a:xfrm>
+            <a:off x="609598" y="468666"/>
+            <a:ext cx="10972800" cy="827426"/>
+          </a:xfrm>
+        </p:spPr>
+        <p:txBody>
+          <a:bodyPr/>
+          <a:lstStyle/>
+          <a:p>
+            <a:pPr>
+              <a:defRPr/>
+            </a:pPr>
+            <a:r>
+              <a:rPr>
+                <a:latin typeface="Arial Black"/>
+                <a:ea typeface="Arial Black"/>
+                <a:cs typeface="Arial Black"/>
+              </a:rPr>
+              <a:t>Schwimmabzeichen: </a:t>
+            </a:r>
+            <a:r>
+              <a:rPr>
+                <a:solidFill>
+                  <a:srgbClr val="FFC000"/>
+                </a:solidFill>
+                <a:latin typeface="Arial Black"/>
+                <a:ea typeface="Arial Black"/>
+                <a:cs typeface="Arial Black"/>
+              </a:rPr>
+              <a:t>Gold</a:t>
+            </a:r>
+            <a:endParaRPr>
+              <a:latin typeface="Arial Black"/>
+              <a:ea typeface="Arial Black"/>
+              <a:cs typeface="Arial Black"/>
+            </a:endParaRPr>
+          </a:p>
+        </p:txBody>
+      </p:sp>
+      <p:sp>
+        <p:nvSpPr>
+          <p:cNvPr id="1847694045" name="" hidden="0"/>
+          <p:cNvSpPr txBox="1"/>
+          <p:nvPr isPhoto="0" userDrawn="0"/>
+        </p:nvSpPr>
+        <p:spPr bwMode="auto">
+          <a:xfrm flipH="0" flipV="0">
+            <a:off x="758404" y="1611090"/>
+            <a:ext cx="11651271" cy="5638835"/>
+          </a:xfrm>
+          <a:prstGeom prst="rect">
+            <a:avLst/>
+          </a:prstGeom>
+          <a:noFill/>
+        </p:spPr>
+        <p:txBody>
+          <a:bodyPr vertOverflow="overflow" horzOverflow="clip" vert="horz" wrap="square" lIns="91440" tIns="45720" rIns="91440" bIns="45720" numCol="1" spcCol="0" rtlCol="0" fromWordArt="0" anchor="t" anchorCtr="0" forceAA="0" upright="0" compatLnSpc="0">
+            <a:spAutoFit/>
+          </a:bodyPr>
+          <a:p>
+            <a:pPr marL="283879" indent="-283879" algn="ctr">
+              <a:buFont typeface="Arial"/>
+              <a:buChar char="–"/>
+              <a:defRPr/>
+            </a:pPr>
+            <a:r>
+              <a:rPr sz="2800">
+                <a:solidFill>
+                  <a:schemeClr val="bg1"/>
+                </a:solidFill>
+                <a:latin typeface="Arial Black"/>
+                <a:ea typeface="Arial Black"/>
+                <a:cs typeface="Arial Black"/>
+              </a:rPr>
+              <a:t>[Silber]</a:t>
+            </a:r>
+            <a:endParaRPr sz="2800">
+              <a:solidFill>
+                <a:schemeClr val="bg1"/>
+              </a:solidFill>
+              <a:latin typeface="Arial Black"/>
+              <a:ea typeface="Arial Black"/>
+              <a:cs typeface="Arial Black"/>
+            </a:endParaRPr>
+          </a:p>
+          <a:p>
+            <a:pPr marL="394023" indent="-394023" algn="ctr">
+              <a:buFont typeface="Arial"/>
+              <a:buChar char="–"/>
+              <a:defRPr/>
+            </a:pPr>
+            <a:r>
+              <a:rPr sz="2800">
+                <a:solidFill>
+                  <a:schemeClr val="bg1"/>
+                </a:solidFill>
+                <a:latin typeface="Arial Black"/>
+                <a:ea typeface="Arial Black"/>
+                <a:cs typeface="Arial Black"/>
+              </a:rPr>
+              <a:t>Fremdrettung</a:t>
+            </a:r>
+            <a:endParaRPr sz="2800">
+              <a:solidFill>
+                <a:schemeClr val="bg1"/>
+              </a:solidFill>
+              <a:latin typeface="Arial Black"/>
+              <a:ea typeface="Arial Black"/>
+              <a:cs typeface="Arial Black"/>
+            </a:endParaRPr>
+          </a:p>
+          <a:p>
+            <a:pPr marL="394023" indent="-394023" algn="ctr">
+              <a:buFont typeface="Arial"/>
+              <a:buChar char="–"/>
+              <a:defRPr/>
+            </a:pPr>
+            <a:r>
+              <a:rPr sz="2800">
+                <a:solidFill>
+                  <a:schemeClr val="bg1"/>
+                </a:solidFill>
+                <a:latin typeface="Arial Black"/>
+                <a:ea typeface="Arial Black"/>
+                <a:cs typeface="Arial Black"/>
+              </a:rPr>
+              <a:t>50m Transportschwimmen</a:t>
+            </a:r>
+            <a:endParaRPr sz="2800">
+              <a:solidFill>
+                <a:schemeClr val="bg1"/>
+              </a:solidFill>
+              <a:latin typeface="Arial Black"/>
+              <a:ea typeface="Arial Black"/>
+              <a:cs typeface="Arial Black"/>
+            </a:endParaRPr>
+          </a:p>
+          <a:p>
+            <a:pPr marL="394023" indent="-394023" algn="ctr">
+              <a:buFont typeface="Arial"/>
+              <a:buChar char="–"/>
+              <a:defRPr/>
+            </a:pPr>
+            <a:r>
+              <a:rPr sz="2800">
+                <a:solidFill>
+                  <a:schemeClr val="bg1"/>
+                </a:solidFill>
+                <a:latin typeface="Arial Black"/>
+                <a:ea typeface="Arial Black"/>
+                <a:cs typeface="Arial Black"/>
+              </a:rPr>
+              <a:t>2m Tief Tauchen + 3 Tauchringe in 3 Minuten und 3 Versuchen</a:t>
+            </a:r>
+            <a:endParaRPr sz="2800">
+              <a:solidFill>
+                <a:schemeClr val="bg1"/>
+              </a:solidFill>
+              <a:latin typeface="Arial Black"/>
+              <a:ea typeface="Arial Black"/>
+              <a:cs typeface="Arial Black"/>
+            </a:endParaRPr>
+          </a:p>
+          <a:p>
+            <a:pPr marL="394023" indent="-394023" algn="ctr">
+              <a:buFont typeface="Arial"/>
+              <a:buChar char="–"/>
+              <a:defRPr/>
+            </a:pPr>
+            <a:endParaRPr sz="2800">
+              <a:solidFill>
+                <a:schemeClr val="bg1"/>
+              </a:solidFill>
+              <a:latin typeface="Arial Black"/>
+              <a:ea typeface="Arial Black"/>
+              <a:cs typeface="Arial Black"/>
+            </a:endParaRPr>
+          </a:p>
+          <a:p>
+            <a:pPr marL="394023" indent="-394023" algn="ctr">
+              <a:buFont typeface="Arial"/>
+              <a:buChar char="–"/>
+              <a:defRPr/>
+            </a:pPr>
+            <a:r>
+              <a:rPr sz="2800">
+                <a:solidFill>
+                  <a:schemeClr val="bg1"/>
+                </a:solidFill>
+                <a:latin typeface="Arial Black"/>
+                <a:ea typeface="Arial Black"/>
+                <a:cs typeface="Arial Black"/>
+              </a:rPr>
+              <a:t>50m Rückenschwimmen mit Grätschwung ohne Arme</a:t>
+            </a:r>
+            <a:endParaRPr sz="2800">
+              <a:solidFill>
+                <a:schemeClr val="bg1"/>
+              </a:solidFill>
+              <a:latin typeface="Arial Black"/>
+              <a:ea typeface="Arial Black"/>
+              <a:cs typeface="Arial Black"/>
+            </a:endParaRPr>
+          </a:p>
+          <a:p>
+            <a:pPr marL="394023" indent="-394023" algn="ctr">
+              <a:buFont typeface="Arial"/>
+              <a:buChar char="–"/>
+              <a:defRPr/>
+            </a:pPr>
+            <a:r>
+              <a:rPr sz="2800">
+                <a:solidFill>
+                  <a:schemeClr val="bg1"/>
+                </a:solidFill>
+                <a:latin typeface="Arial Black"/>
+                <a:ea typeface="Arial Black"/>
+                <a:cs typeface="Arial Black"/>
+              </a:rPr>
+              <a:t>50m Kraulschwimmen</a:t>
+            </a:r>
+            <a:endParaRPr sz="2800">
+              <a:solidFill>
+                <a:schemeClr val="bg1"/>
+              </a:solidFill>
+              <a:latin typeface="Arial Black"/>
+              <a:ea typeface="Arial Black"/>
+              <a:cs typeface="Arial Black"/>
+            </a:endParaRPr>
+          </a:p>
+          <a:p>
+            <a:pPr marL="394023" indent="-394023" algn="ctr">
+              <a:buFont typeface="Arial"/>
+              <a:buChar char="–"/>
+              <a:defRPr/>
+            </a:pPr>
+            <a:endParaRPr sz="2800">
+              <a:solidFill>
+                <a:schemeClr val="bg1"/>
+              </a:solidFill>
+              <a:latin typeface="Arial Black"/>
+              <a:ea typeface="Arial Black"/>
+              <a:cs typeface="Arial Black"/>
+            </a:endParaRPr>
+          </a:p>
+          <a:p>
+            <a:pPr marL="394023" indent="-394023" algn="ctr">
+              <a:buFont typeface="Arial"/>
+              <a:buChar char="–"/>
+              <a:defRPr/>
+            </a:pPr>
+            <a:r>
+              <a:rPr sz="2800">
+                <a:solidFill>
+                  <a:schemeClr val="bg1"/>
+                </a:solidFill>
+                <a:latin typeface="Arial Black"/>
+                <a:ea typeface="Arial Black"/>
+                <a:cs typeface="Arial Black"/>
+              </a:rPr>
+              <a:t>Sprung mit Kopf vorraus vom Beckenrand, dann mindestens 800m in 30 Minuten Schwimmen {650m Brauch- / Rückenlage, 150m in einer anderen}</a:t>
+            </a:r>
+            <a:endParaRPr sz="2800">
+              <a:solidFill>
+                <a:schemeClr val="bg1"/>
+              </a:solidFill>
+              <a:latin typeface="Arial Black"/>
+              <a:ea typeface="Arial Black"/>
+              <a:cs typeface="Arial Black"/>
+            </a:endParaRPr>
+          </a:p>
+          <a:p>
+            <a:pPr marL="394023" indent="-394023" algn="ctr">
+              <a:buFont typeface="Arial"/>
+              <a:buChar char="–"/>
+              <a:defRPr/>
+            </a:pPr>
+            <a:endParaRPr sz="2800">
+              <a:solidFill>
+                <a:schemeClr val="bg1"/>
+              </a:solidFill>
+              <a:latin typeface="Arial Black"/>
+              <a:ea typeface="Arial Black"/>
+              <a:cs typeface="Arial Black"/>
+            </a:endParaRPr>
+          </a:p>
+        </p:txBody>
+      </p:sp>
+    </p:spTree>
+  </p:cSld>
+  <p:clrMapOvr>
+    <a:masterClrMapping/>
+  </p:clrMapOvr>
+  <mc:AlternateContent xmlns:mc="http://schemas.openxmlformats.org/markup-compatibility/2006">
+    <mc:Choice xmlns:p14="http://schemas.microsoft.com/office/powerpoint/2010/main" Requires="p14">
+      <p:transition p14:dur="2000" advClick="1"/>
+    </mc:Choice>
+    <mc:Fallback>
+      <p:transition advClick="1"/>
+    </mc:Fallback>
+  </mc:AlternateContent>
+</p:sld>
+</file>
+
 <file path=ppt/theme/theme1.xml><?xml version="1.0" encoding="utf-8"?>
 <a:theme xmlns:a="http://schemas.openxmlformats.org/drawingml/2006/main" xmlns:r="http://schemas.openxmlformats.org/officeDocument/2006/relationships" xmlns:p="http://schemas.openxmlformats.org/presentationml/2006/main" name="Dotted">
   <a:themeElements>

</xml_diff>